<commit_message>
added one code file
</commit_message>
<xml_diff>
--- a/1_Openai/1_OpenAI API.pptx
+++ b/1_Openai/1_OpenAI API.pptx
@@ -121,6 +121,11 @@
       </a:defRPr>
     </a:lvl9pPr>
   </p:defaultTextStyle>
+  <p:extLst>
+    <p:ext uri="{EFAFB233-063F-42B5-8137-9DF3F51BA10A}">
+      <p15:sldGuideLst xmlns:p15="http://schemas.microsoft.com/office/powerpoint/2012/main"/>
+    </p:ext>
+  </p:extLst>
 </p:presentation>
 </file>
 
@@ -273,7 +278,7 @@
           <a:p>
             <a:fld id="{184D1BB2-AA72-4209-995F-47590C60EBD7}" type="datetimeFigureOut">
               <a:rPr lang="en-GB" smtClean="0"/>
-              <a:t>23/09/2025</a:t>
+              <a:t>24/09/2025</a:t>
             </a:fld>
             <a:endParaRPr lang="en-GB"/>
           </a:p>
@@ -473,7 +478,7 @@
           <a:p>
             <a:fld id="{184D1BB2-AA72-4209-995F-47590C60EBD7}" type="datetimeFigureOut">
               <a:rPr lang="en-GB" smtClean="0"/>
-              <a:t>23/09/2025</a:t>
+              <a:t>24/09/2025</a:t>
             </a:fld>
             <a:endParaRPr lang="en-GB"/>
           </a:p>
@@ -683,7 +688,7 @@
           <a:p>
             <a:fld id="{184D1BB2-AA72-4209-995F-47590C60EBD7}" type="datetimeFigureOut">
               <a:rPr lang="en-GB" smtClean="0"/>
-              <a:t>23/09/2025</a:t>
+              <a:t>24/09/2025</a:t>
             </a:fld>
             <a:endParaRPr lang="en-GB"/>
           </a:p>
@@ -883,7 +888,7 @@
           <a:p>
             <a:fld id="{184D1BB2-AA72-4209-995F-47590C60EBD7}" type="datetimeFigureOut">
               <a:rPr lang="en-GB" smtClean="0"/>
-              <a:t>23/09/2025</a:t>
+              <a:t>24/09/2025</a:t>
             </a:fld>
             <a:endParaRPr lang="en-GB"/>
           </a:p>
@@ -1159,7 +1164,7 @@
           <a:p>
             <a:fld id="{184D1BB2-AA72-4209-995F-47590C60EBD7}" type="datetimeFigureOut">
               <a:rPr lang="en-GB" smtClean="0"/>
-              <a:t>23/09/2025</a:t>
+              <a:t>24/09/2025</a:t>
             </a:fld>
             <a:endParaRPr lang="en-GB"/>
           </a:p>
@@ -1427,7 +1432,7 @@
           <a:p>
             <a:fld id="{184D1BB2-AA72-4209-995F-47590C60EBD7}" type="datetimeFigureOut">
               <a:rPr lang="en-GB" smtClean="0"/>
-              <a:t>23/09/2025</a:t>
+              <a:t>24/09/2025</a:t>
             </a:fld>
             <a:endParaRPr lang="en-GB"/>
           </a:p>
@@ -1842,7 +1847,7 @@
           <a:p>
             <a:fld id="{184D1BB2-AA72-4209-995F-47590C60EBD7}" type="datetimeFigureOut">
               <a:rPr lang="en-GB" smtClean="0"/>
-              <a:t>23/09/2025</a:t>
+              <a:t>24/09/2025</a:t>
             </a:fld>
             <a:endParaRPr lang="en-GB"/>
           </a:p>
@@ -1984,7 +1989,7 @@
           <a:p>
             <a:fld id="{184D1BB2-AA72-4209-995F-47590C60EBD7}" type="datetimeFigureOut">
               <a:rPr lang="en-GB" smtClean="0"/>
-              <a:t>23/09/2025</a:t>
+              <a:t>24/09/2025</a:t>
             </a:fld>
             <a:endParaRPr lang="en-GB"/>
           </a:p>
@@ -2097,7 +2102,7 @@
           <a:p>
             <a:fld id="{184D1BB2-AA72-4209-995F-47590C60EBD7}" type="datetimeFigureOut">
               <a:rPr lang="en-GB" smtClean="0"/>
-              <a:t>23/09/2025</a:t>
+              <a:t>24/09/2025</a:t>
             </a:fld>
             <a:endParaRPr lang="en-GB"/>
           </a:p>
@@ -2410,7 +2415,7 @@
           <a:p>
             <a:fld id="{184D1BB2-AA72-4209-995F-47590C60EBD7}" type="datetimeFigureOut">
               <a:rPr lang="en-GB" smtClean="0"/>
-              <a:t>23/09/2025</a:t>
+              <a:t>24/09/2025</a:t>
             </a:fld>
             <a:endParaRPr lang="en-GB"/>
           </a:p>
@@ -2699,7 +2704,7 @@
           <a:p>
             <a:fld id="{184D1BB2-AA72-4209-995F-47590C60EBD7}" type="datetimeFigureOut">
               <a:rPr lang="en-GB" smtClean="0"/>
-              <a:t>23/09/2025</a:t>
+              <a:t>24/09/2025</a:t>
             </a:fld>
             <a:endParaRPr lang="en-GB"/>
           </a:p>
@@ -2942,7 +2947,7 @@
           <a:p>
             <a:fld id="{184D1BB2-AA72-4209-995F-47590C60EBD7}" type="datetimeFigureOut">
               <a:rPr lang="en-GB" smtClean="0"/>
-              <a:t>23/09/2025</a:t>
+              <a:t>24/09/2025</a:t>
             </a:fld>
             <a:endParaRPr lang="en-GB"/>
           </a:p>
@@ -7726,11 +7731,17 @@
           <p:cNvGraphicFramePr>
             <a:graphicFrameLocks noGrp="1"/>
           </p:cNvGraphicFramePr>
-          <p:nvPr/>
+          <p:nvPr>
+            <p:extLst>
+              <p:ext uri="{D42A27DB-BD31-4B8C-83A1-F6EECF244321}">
+                <p14:modId xmlns:p14="http://schemas.microsoft.com/office/powerpoint/2010/main" val="584573381"/>
+              </p:ext>
+            </p:extLst>
+          </p:nvPr>
         </p:nvGraphicFramePr>
         <p:xfrm>
           <a:off x="838200" y="2385854"/>
-          <a:ext cx="9959904" cy="3230880"/>
+          <a:ext cx="9959904" cy="3601720"/>
         </p:xfrm>
         <a:graphic>
           <a:graphicData uri="http://schemas.openxmlformats.org/drawingml/2006/table">
@@ -8199,6 +8210,62 @@
                 <a:extLst>
                   <a:ext uri="{0D108BD9-81ED-4DB2-BD59-A6C34878D82A}">
                     <a16:rowId xmlns:a16="http://schemas.microsoft.com/office/drawing/2014/main" val="853410560"/>
+                  </a:ext>
+                </a:extLst>
+              </a:tr>
+              <a:tr h="370840">
+                <a:tc>
+                  <a:txBody>
+                    <a:bodyPr/>
+                    <a:lstStyle/>
+                    <a:p>
+                      <a:pPr marL="0" marR="0" lvl="0" indent="0" algn="l" defTabSz="914400" rtl="0" eaLnBrk="1" fontAlgn="auto" latinLnBrk="0" hangingPunct="1">
+                        <a:lnSpc>
+                          <a:spcPct val="100000"/>
+                        </a:lnSpc>
+                        <a:spcBef>
+                          <a:spcPts val="0"/>
+                        </a:spcBef>
+                        <a:spcAft>
+                          <a:spcPts val="0"/>
+                        </a:spcAft>
+                        <a:buClrTx/>
+                        <a:buSzTx/>
+                        <a:buFontTx/>
+                        <a:buNone/>
+                        <a:tabLst/>
+                        <a:defRPr/>
+                      </a:pPr>
+                      <a:r>
+                        <a:rPr lang="en-IN" dirty="0"/>
+                        <a:t>1_10_openai_responses.py</a:t>
+                      </a:r>
+                      <a:endParaRPr lang="en-GB" dirty="0"/>
+                    </a:p>
+                  </a:txBody>
+                  <a:tcPr/>
+                </a:tc>
+                <a:tc>
+                  <a:txBody>
+                    <a:bodyPr/>
+                    <a:lstStyle/>
+                    <a:p>
+                      <a:r>
+                        <a:rPr lang="en-IN" dirty="0"/>
+                        <a:t>Chatbot for Warren Buffett </a:t>
+                      </a:r>
+                      <a:r>
+                        <a:rPr lang="en-IN"/>
+                        <a:t>related questions</a:t>
+                      </a:r>
+                      <a:endParaRPr lang="en-GB" dirty="0"/>
+                    </a:p>
+                  </a:txBody>
+                  <a:tcPr/>
+                </a:tc>
+                <a:extLst>
+                  <a:ext uri="{0D108BD9-81ED-4DB2-BD59-A6C34878D82A}">
+                    <a16:rowId xmlns:a16="http://schemas.microsoft.com/office/drawing/2014/main" val="1169215687"/>
                   </a:ext>
                 </a:extLst>
               </a:tr>

</xml_diff>